<commit_message>
Raspberry Pi Setup ppt
</commit_message>
<xml_diff>
--- a/4-The Raspberry Pi Platform and Python Programming for the Raspberry Pi/Week1/1_ Setup.pptx
+++ b/4-The Raspberry Pi Platform and Python Programming for the Raspberry Pi/Week1/1_ Setup.pptx
@@ -217,7 +217,7 @@
           <a:p>
             <a:fld id="{64EEEFF4-FCB2-4B35-8A62-112366FDAB73}" type="datetimeFigureOut">
               <a:rPr lang="en-US" smtClean="0"/>
-              <a:t>12/12/2020</a:t>
+              <a:t>12/13/2020</a:t>
             </a:fld>
             <a:endParaRPr lang="en-US"/>
           </a:p>
@@ -631,7 +631,7 @@
           <a:p>
             <a:fld id="{99E46098-4F02-4E9A-8CC3-2D9BC89E233D}" type="datetime1">
               <a:rPr lang="en-US" smtClean="0"/>
-              <a:t>12/12/2020</a:t>
+              <a:t>12/13/2020</a:t>
             </a:fld>
             <a:endParaRPr lang="en-US"/>
           </a:p>
@@ -829,7 +829,7 @@
           <a:p>
             <a:fld id="{66160625-B962-4BE2-ACD3-ED798001CA8D}" type="datetime1">
               <a:rPr lang="en-US" smtClean="0"/>
-              <a:t>12/12/2020</a:t>
+              <a:t>12/13/2020</a:t>
             </a:fld>
             <a:endParaRPr lang="en-US"/>
           </a:p>
@@ -1037,7 +1037,7 @@
           <a:p>
             <a:fld id="{336E061E-9EF8-4D46-A535-4155EB590976}" type="datetime1">
               <a:rPr lang="en-US" smtClean="0"/>
-              <a:t>12/12/2020</a:t>
+              <a:t>12/13/2020</a:t>
             </a:fld>
             <a:endParaRPr lang="en-US"/>
           </a:p>
@@ -1235,7 +1235,7 @@
           <a:p>
             <a:fld id="{CDB6157F-160A-48E7-B33D-7D51E920C7E4}" type="datetime1">
               <a:rPr lang="en-US" smtClean="0"/>
-              <a:t>12/12/2020</a:t>
+              <a:t>12/13/2020</a:t>
             </a:fld>
             <a:endParaRPr lang="en-US"/>
           </a:p>
@@ -1526,7 +1526,7 @@
           <a:p>
             <a:fld id="{0C42231D-3568-4058-8F21-DC778CEBE9FF}" type="datetime1">
               <a:rPr lang="en-US" smtClean="0"/>
-              <a:t>12/12/2020</a:t>
+              <a:t>12/13/2020</a:t>
             </a:fld>
             <a:endParaRPr lang="en-US"/>
           </a:p>
@@ -1791,7 +1791,7 @@
           <a:p>
             <a:fld id="{0CEC07A3-BE54-46ED-B8AB-28E990D6A4FD}" type="datetime1">
               <a:rPr lang="en-US" smtClean="0"/>
-              <a:t>12/12/2020</a:t>
+              <a:t>12/13/2020</a:t>
             </a:fld>
             <a:endParaRPr lang="en-US"/>
           </a:p>
@@ -2203,7 +2203,7 @@
           <a:p>
             <a:fld id="{ABE92364-606B-4909-89F5-538CE9509774}" type="datetime1">
               <a:rPr lang="en-US" smtClean="0"/>
-              <a:t>12/12/2020</a:t>
+              <a:t>12/13/2020</a:t>
             </a:fld>
             <a:endParaRPr lang="en-US"/>
           </a:p>
@@ -2344,7 +2344,7 @@
           <a:p>
             <a:fld id="{FD8CD9D4-951C-4C4B-ACBF-0F0336A7C953}" type="datetime1">
               <a:rPr lang="en-US" smtClean="0"/>
-              <a:t>12/12/2020</a:t>
+              <a:t>12/13/2020</a:t>
             </a:fld>
             <a:endParaRPr lang="en-US"/>
           </a:p>
@@ -2468,7 +2468,7 @@
           <a:p>
             <a:fld id="{EA765226-68FC-42CB-B02B-DC2325FE5881}" type="datetime1">
               <a:rPr lang="en-US" smtClean="0"/>
-              <a:t>12/12/2020</a:t>
+              <a:t>12/13/2020</a:t>
             </a:fld>
             <a:endParaRPr lang="en-US"/>
           </a:p>
@@ -2779,7 +2779,7 @@
           <a:p>
             <a:fld id="{4C6568C0-7177-4FCE-AB76-F4BAD45D1BB3}" type="datetime1">
               <a:rPr lang="en-US" smtClean="0"/>
-              <a:t>12/12/2020</a:t>
+              <a:t>12/13/2020</a:t>
             </a:fld>
             <a:endParaRPr lang="en-US"/>
           </a:p>
@@ -3067,7 +3067,7 @@
           <a:p>
             <a:fld id="{5CE1C34D-CB27-4C91-AC4D-C82B1740C93A}" type="datetime1">
               <a:rPr lang="en-US" smtClean="0"/>
-              <a:t>12/12/2020</a:t>
+              <a:t>12/13/2020</a:t>
             </a:fld>
             <a:endParaRPr lang="en-US"/>
           </a:p>
@@ -3308,7 +3308,7 @@
           <a:p>
             <a:fld id="{3184D8EE-FCD1-43EC-9B6F-5EEE263D533F}" type="datetime1">
               <a:rPr lang="en-US" smtClean="0"/>
-              <a:t>12/12/2020</a:t>
+              <a:t>12/13/2020</a:t>
             </a:fld>
             <a:endParaRPr lang="en-US"/>
           </a:p>
@@ -5549,10 +5549,24 @@
               </a:rPr>
               <a:t>https://learn.sparkfun.com/tutorials/setting-up-raspbian-and-doom</a:t>
             </a:r>
-            <a:r>
-              <a:rPr lang="en-US" dirty="0"/>
+            <a:endParaRPr lang="fa-IR" dirty="0"/>
+          </a:p>
+          <a:p>
+            <a:r>
+              <a:rPr lang="en-US" dirty="0">
+                <a:hlinkClick r:id="rId3"/>
+              </a:rPr>
+              <a:t>https://www.youtube.com/watch?v=y45hsd2AOpw</a:t>
+            </a:r>
+            <a:r>
+              <a:rPr lang="fa-IR"/>
               <a:t> </a:t>
             </a:r>
+            <a:r>
+              <a:rPr lang="en-US"/>
+              <a:t> </a:t>
+            </a:r>
+            <a:endParaRPr lang="en-US" dirty="0"/>
           </a:p>
         </p:txBody>
       </p:sp>

</xml_diff>